<commit_message>
changed few deisgn elements
</commit_message>
<xml_diff>
--- a/img/button_hover.pptx
+++ b/img/button_hover.pptx
@@ -104,6 +104,11 @@
       </a:defRPr>
     </a:lvl9pPr>
   </p:defaultTextStyle>
+  <p:extLst>
+    <p:ext uri="{EFAFB233-063F-42B5-8137-9DF3F51BA10A}">
+      <p15:sldGuideLst xmlns:p15="http://schemas.microsoft.com/office/powerpoint/2012/main"/>
+    </p:ext>
+  </p:extLst>
 </p:presentation>
 </file>
 
@@ -238,7 +243,7 @@
           <a:p>
             <a:fld id="{3B638056-2271-4463-BAE1-4AC5602DC725}" type="datetimeFigureOut">
               <a:rPr lang="en-US" smtClean="0"/>
-              <a:t>5/11/2015</a:t>
+              <a:t>11/10/2015</a:t>
             </a:fld>
             <a:endParaRPr lang="en-US"/>
           </a:p>
@@ -408,7 +413,7 @@
           <a:p>
             <a:fld id="{3B638056-2271-4463-BAE1-4AC5602DC725}" type="datetimeFigureOut">
               <a:rPr lang="en-US" smtClean="0"/>
-              <a:t>5/11/2015</a:t>
+              <a:t>11/10/2015</a:t>
             </a:fld>
             <a:endParaRPr lang="en-US"/>
           </a:p>
@@ -588,7 +593,7 @@
           <a:p>
             <a:fld id="{3B638056-2271-4463-BAE1-4AC5602DC725}" type="datetimeFigureOut">
               <a:rPr lang="en-US" smtClean="0"/>
-              <a:t>5/11/2015</a:t>
+              <a:t>11/10/2015</a:t>
             </a:fld>
             <a:endParaRPr lang="en-US"/>
           </a:p>
@@ -758,7 +763,7 @@
           <a:p>
             <a:fld id="{3B638056-2271-4463-BAE1-4AC5602DC725}" type="datetimeFigureOut">
               <a:rPr lang="en-US" smtClean="0"/>
-              <a:t>5/11/2015</a:t>
+              <a:t>11/10/2015</a:t>
             </a:fld>
             <a:endParaRPr lang="en-US"/>
           </a:p>
@@ -1004,7 +1009,7 @@
           <a:p>
             <a:fld id="{3B638056-2271-4463-BAE1-4AC5602DC725}" type="datetimeFigureOut">
               <a:rPr lang="en-US" smtClean="0"/>
-              <a:t>5/11/2015</a:t>
+              <a:t>11/10/2015</a:t>
             </a:fld>
             <a:endParaRPr lang="en-US"/>
           </a:p>
@@ -1236,7 +1241,7 @@
           <a:p>
             <a:fld id="{3B638056-2271-4463-BAE1-4AC5602DC725}" type="datetimeFigureOut">
               <a:rPr lang="en-US" smtClean="0"/>
-              <a:t>5/11/2015</a:t>
+              <a:t>11/10/2015</a:t>
             </a:fld>
             <a:endParaRPr lang="en-US"/>
           </a:p>
@@ -1603,7 +1608,7 @@
           <a:p>
             <a:fld id="{3B638056-2271-4463-BAE1-4AC5602DC725}" type="datetimeFigureOut">
               <a:rPr lang="en-US" smtClean="0"/>
-              <a:t>5/11/2015</a:t>
+              <a:t>11/10/2015</a:t>
             </a:fld>
             <a:endParaRPr lang="en-US"/>
           </a:p>
@@ -1721,7 +1726,7 @@
           <a:p>
             <a:fld id="{3B638056-2271-4463-BAE1-4AC5602DC725}" type="datetimeFigureOut">
               <a:rPr lang="en-US" smtClean="0"/>
-              <a:t>5/11/2015</a:t>
+              <a:t>11/10/2015</a:t>
             </a:fld>
             <a:endParaRPr lang="en-US"/>
           </a:p>
@@ -1816,7 +1821,7 @@
           <a:p>
             <a:fld id="{3B638056-2271-4463-BAE1-4AC5602DC725}" type="datetimeFigureOut">
               <a:rPr lang="en-US" smtClean="0"/>
-              <a:t>5/11/2015</a:t>
+              <a:t>11/10/2015</a:t>
             </a:fld>
             <a:endParaRPr lang="en-US"/>
           </a:p>
@@ -2093,7 +2098,7 @@
           <a:p>
             <a:fld id="{3B638056-2271-4463-BAE1-4AC5602DC725}" type="datetimeFigureOut">
               <a:rPr lang="en-US" smtClean="0"/>
-              <a:t>5/11/2015</a:t>
+              <a:t>11/10/2015</a:t>
             </a:fld>
             <a:endParaRPr lang="en-US"/>
           </a:p>
@@ -2346,7 +2351,7 @@
           <a:p>
             <a:fld id="{3B638056-2271-4463-BAE1-4AC5602DC725}" type="datetimeFigureOut">
               <a:rPr lang="en-US" smtClean="0"/>
-              <a:t>5/11/2015</a:t>
+              <a:t>11/10/2015</a:t>
             </a:fld>
             <a:endParaRPr lang="en-US"/>
           </a:p>
@@ -2559,7 +2564,7 @@
           <a:p>
             <a:fld id="{3B638056-2271-4463-BAE1-4AC5602DC725}" type="datetimeFigureOut">
               <a:rPr lang="en-US" smtClean="0"/>
-              <a:t>5/11/2015</a:t>
+              <a:t>11/10/2015</a:t>
             </a:fld>
             <a:endParaRPr lang="en-US"/>
           </a:p>
@@ -2979,7 +2984,7 @@
             <a:avLst/>
           </a:prstGeom>
           <a:solidFill>
-            <a:srgbClr val="22CCEE"/>
+            <a:srgbClr val="23B4A4"/>
           </a:solidFill>
           <a:ln w="28575">
             <a:solidFill>
@@ -3037,7 +3042,7 @@
             <a:avLst/>
           </a:prstGeom>
           <a:solidFill>
-            <a:srgbClr val="22CCEE"/>
+            <a:srgbClr val="23B4A4"/>
           </a:solidFill>
           <a:ln w="28575">
             <a:solidFill>
@@ -3095,7 +3100,7 @@
             <a:avLst/>
           </a:prstGeom>
           <a:solidFill>
-            <a:srgbClr val="22CCEE"/>
+            <a:srgbClr val="23B4A4"/>
           </a:solidFill>
           <a:ln w="28575">
             <a:solidFill>
@@ -3153,7 +3158,7 @@
             <a:avLst/>
           </a:prstGeom>
           <a:solidFill>
-            <a:srgbClr val="22CCEE"/>
+            <a:srgbClr val="23B4A4"/>
           </a:solidFill>
           <a:ln w="28575">
             <a:solidFill>

</xml_diff>

<commit_message>
small modal edits, nav button edits
</commit_message>
<xml_diff>
--- a/img/button_hover.pptx
+++ b/img/button_hover.pptx
@@ -243,7 +243,7 @@
           <a:p>
             <a:fld id="{3B638056-2271-4463-BAE1-4AC5602DC725}" type="datetimeFigureOut">
               <a:rPr lang="en-US" smtClean="0"/>
-              <a:t>11/10/2015</a:t>
+              <a:t>12/21/2015</a:t>
             </a:fld>
             <a:endParaRPr lang="en-US"/>
           </a:p>
@@ -413,7 +413,7 @@
           <a:p>
             <a:fld id="{3B638056-2271-4463-BAE1-4AC5602DC725}" type="datetimeFigureOut">
               <a:rPr lang="en-US" smtClean="0"/>
-              <a:t>11/10/2015</a:t>
+              <a:t>12/21/2015</a:t>
             </a:fld>
             <a:endParaRPr lang="en-US"/>
           </a:p>
@@ -593,7 +593,7 @@
           <a:p>
             <a:fld id="{3B638056-2271-4463-BAE1-4AC5602DC725}" type="datetimeFigureOut">
               <a:rPr lang="en-US" smtClean="0"/>
-              <a:t>11/10/2015</a:t>
+              <a:t>12/21/2015</a:t>
             </a:fld>
             <a:endParaRPr lang="en-US"/>
           </a:p>
@@ -763,7 +763,7 @@
           <a:p>
             <a:fld id="{3B638056-2271-4463-BAE1-4AC5602DC725}" type="datetimeFigureOut">
               <a:rPr lang="en-US" smtClean="0"/>
-              <a:t>11/10/2015</a:t>
+              <a:t>12/21/2015</a:t>
             </a:fld>
             <a:endParaRPr lang="en-US"/>
           </a:p>
@@ -1009,7 +1009,7 @@
           <a:p>
             <a:fld id="{3B638056-2271-4463-BAE1-4AC5602DC725}" type="datetimeFigureOut">
               <a:rPr lang="en-US" smtClean="0"/>
-              <a:t>11/10/2015</a:t>
+              <a:t>12/21/2015</a:t>
             </a:fld>
             <a:endParaRPr lang="en-US"/>
           </a:p>
@@ -1241,7 +1241,7 @@
           <a:p>
             <a:fld id="{3B638056-2271-4463-BAE1-4AC5602DC725}" type="datetimeFigureOut">
               <a:rPr lang="en-US" smtClean="0"/>
-              <a:t>11/10/2015</a:t>
+              <a:t>12/21/2015</a:t>
             </a:fld>
             <a:endParaRPr lang="en-US"/>
           </a:p>
@@ -1608,7 +1608,7 @@
           <a:p>
             <a:fld id="{3B638056-2271-4463-BAE1-4AC5602DC725}" type="datetimeFigureOut">
               <a:rPr lang="en-US" smtClean="0"/>
-              <a:t>11/10/2015</a:t>
+              <a:t>12/21/2015</a:t>
             </a:fld>
             <a:endParaRPr lang="en-US"/>
           </a:p>
@@ -1726,7 +1726,7 @@
           <a:p>
             <a:fld id="{3B638056-2271-4463-BAE1-4AC5602DC725}" type="datetimeFigureOut">
               <a:rPr lang="en-US" smtClean="0"/>
-              <a:t>11/10/2015</a:t>
+              <a:t>12/21/2015</a:t>
             </a:fld>
             <a:endParaRPr lang="en-US"/>
           </a:p>
@@ -1821,7 +1821,7 @@
           <a:p>
             <a:fld id="{3B638056-2271-4463-BAE1-4AC5602DC725}" type="datetimeFigureOut">
               <a:rPr lang="en-US" smtClean="0"/>
-              <a:t>11/10/2015</a:t>
+              <a:t>12/21/2015</a:t>
             </a:fld>
             <a:endParaRPr lang="en-US"/>
           </a:p>
@@ -2098,7 +2098,7 @@
           <a:p>
             <a:fld id="{3B638056-2271-4463-BAE1-4AC5602DC725}" type="datetimeFigureOut">
               <a:rPr lang="en-US" smtClean="0"/>
-              <a:t>11/10/2015</a:t>
+              <a:t>12/21/2015</a:t>
             </a:fld>
             <a:endParaRPr lang="en-US"/>
           </a:p>
@@ -2351,7 +2351,7 @@
           <a:p>
             <a:fld id="{3B638056-2271-4463-BAE1-4AC5602DC725}" type="datetimeFigureOut">
               <a:rPr lang="en-US" smtClean="0"/>
-              <a:t>11/10/2015</a:t>
+              <a:t>12/21/2015</a:t>
             </a:fld>
             <a:endParaRPr lang="en-US"/>
           </a:p>
@@ -2564,7 +2564,7 @@
           <a:p>
             <a:fld id="{3B638056-2271-4463-BAE1-4AC5602DC725}" type="datetimeFigureOut">
               <a:rPr lang="en-US" smtClean="0"/>
-              <a:t>11/10/2015</a:t>
+              <a:t>12/21/2015</a:t>
             </a:fld>
             <a:endParaRPr lang="en-US"/>
           </a:p>
@@ -2977,7 +2977,7 @@
         </p:nvSpPr>
         <p:spPr>
           <a:xfrm>
-            <a:off x="3330388" y="582707"/>
+            <a:off x="338417" y="3827930"/>
             <a:ext cx="2438399" cy="2438400"/>
           </a:xfrm>
           <a:prstGeom prst="ellipse">
@@ -3035,7 +3035,7 @@
         </p:nvSpPr>
         <p:spPr>
           <a:xfrm>
-            <a:off x="3330387" y="3680013"/>
+            <a:off x="3366247" y="3827930"/>
             <a:ext cx="2438399" cy="2438400"/>
           </a:xfrm>
           <a:prstGeom prst="ellipse">
@@ -3093,7 +3093,7 @@
         </p:nvSpPr>
         <p:spPr>
           <a:xfrm>
-            <a:off x="7014883" y="3975848"/>
+            <a:off x="9421905" y="3827930"/>
             <a:ext cx="2438399" cy="2438400"/>
           </a:xfrm>
           <a:prstGeom prst="ellipse">
@@ -3151,7 +3151,7 @@
         </p:nvSpPr>
         <p:spPr>
           <a:xfrm>
-            <a:off x="8234083" y="470648"/>
+            <a:off x="6394076" y="3827930"/>
             <a:ext cx="2438399" cy="2438400"/>
           </a:xfrm>
           <a:prstGeom prst="ellipse">
@@ -3201,6 +3201,370 @@
           </a:p>
         </p:txBody>
       </p:sp>
+      <p:grpSp>
+        <p:nvGrpSpPr>
+          <p:cNvPr id="8" name="Group 7"/>
+          <p:cNvGrpSpPr/>
+          <p:nvPr/>
+        </p:nvGrpSpPr>
+        <p:grpSpPr>
+          <a:xfrm>
+            <a:off x="338416" y="851645"/>
+            <a:ext cx="2438400" cy="2438400"/>
+            <a:chOff x="338416" y="851645"/>
+            <a:chExt cx="2438400" cy="2438400"/>
+          </a:xfrm>
+        </p:grpSpPr>
+        <p:pic>
+          <p:nvPicPr>
+            <p:cNvPr id="4" name="Picture 3"/>
+            <p:cNvPicPr>
+              <a:picLocks noChangeAspect="1"/>
+            </p:cNvPicPr>
+            <p:nvPr/>
+          </p:nvPicPr>
+          <p:blipFill>
+            <a:blip r:embed="rId2">
+              <a:extLst>
+                <a:ext uri="{28A0092B-C50C-407E-A947-70E740481C1C}">
+                  <a14:useLocalDpi xmlns:a14="http://schemas.microsoft.com/office/drawing/2010/main" val="0"/>
+                </a:ext>
+              </a:extLst>
+            </a:blip>
+            <a:stretch>
+              <a:fillRect/>
+            </a:stretch>
+          </p:blipFill>
+          <p:spPr>
+            <a:xfrm>
+              <a:off x="338416" y="851645"/>
+              <a:ext cx="2438400" cy="2438400"/>
+            </a:xfrm>
+            <a:prstGeom prst="rect">
+              <a:avLst/>
+            </a:prstGeom>
+          </p:spPr>
+        </p:pic>
+        <p:sp>
+          <p:nvSpPr>
+            <p:cNvPr id="6" name="Oval 5"/>
+            <p:cNvSpPr/>
+            <p:nvPr/>
+          </p:nvSpPr>
+          <p:spPr>
+            <a:xfrm>
+              <a:off x="338416" y="851646"/>
+              <a:ext cx="2438399" cy="2438399"/>
+            </a:xfrm>
+            <a:prstGeom prst="ellipse">
+              <a:avLst/>
+            </a:prstGeom>
+            <a:noFill/>
+            <a:ln>
+              <a:solidFill>
+                <a:srgbClr val="23B4A4"/>
+              </a:solidFill>
+            </a:ln>
+          </p:spPr>
+          <p:style>
+            <a:lnRef idx="2">
+              <a:schemeClr val="accent1">
+                <a:shade val="50000"/>
+              </a:schemeClr>
+            </a:lnRef>
+            <a:fillRef idx="1">
+              <a:schemeClr val="accent1"/>
+            </a:fillRef>
+            <a:effectRef idx="0">
+              <a:schemeClr val="accent1"/>
+            </a:effectRef>
+            <a:fontRef idx="minor">
+              <a:schemeClr val="lt1"/>
+            </a:fontRef>
+          </p:style>
+          <p:txBody>
+            <a:bodyPr rtlCol="0" anchor="ctr"/>
+            <a:lstStyle/>
+            <a:p>
+              <a:pPr algn="ctr"/>
+              <a:endParaRPr lang="en-US"/>
+            </a:p>
+          </p:txBody>
+        </p:sp>
+      </p:grpSp>
+      <p:grpSp>
+        <p:nvGrpSpPr>
+          <p:cNvPr id="17" name="Group 16"/>
+          <p:cNvGrpSpPr/>
+          <p:nvPr/>
+        </p:nvGrpSpPr>
+        <p:grpSpPr>
+          <a:xfrm>
+            <a:off x="3330386" y="851645"/>
+            <a:ext cx="2438401" cy="2438402"/>
+            <a:chOff x="3330386" y="851645"/>
+            <a:chExt cx="2438401" cy="2438402"/>
+          </a:xfrm>
+        </p:grpSpPr>
+        <p:pic>
+          <p:nvPicPr>
+            <p:cNvPr id="2" name="Picture 1"/>
+            <p:cNvPicPr>
+              <a:picLocks noChangeAspect="1"/>
+            </p:cNvPicPr>
+            <p:nvPr/>
+          </p:nvPicPr>
+          <p:blipFill>
+            <a:blip r:embed="rId3">
+              <a:extLst>
+                <a:ext uri="{28A0092B-C50C-407E-A947-70E740481C1C}">
+                  <a14:useLocalDpi xmlns:a14="http://schemas.microsoft.com/office/drawing/2010/main" val="0"/>
+                </a:ext>
+              </a:extLst>
+            </a:blip>
+            <a:stretch>
+              <a:fillRect/>
+            </a:stretch>
+          </p:blipFill>
+          <p:spPr>
+            <a:xfrm>
+              <a:off x="3330387" y="851647"/>
+              <a:ext cx="2438400" cy="2438400"/>
+            </a:xfrm>
+            <a:prstGeom prst="rect">
+              <a:avLst/>
+            </a:prstGeom>
+          </p:spPr>
+        </p:pic>
+        <p:sp>
+          <p:nvSpPr>
+            <p:cNvPr id="12" name="Oval 11"/>
+            <p:cNvSpPr/>
+            <p:nvPr/>
+          </p:nvSpPr>
+          <p:spPr>
+            <a:xfrm>
+              <a:off x="3330386" y="851645"/>
+              <a:ext cx="2438399" cy="2438399"/>
+            </a:xfrm>
+            <a:prstGeom prst="ellipse">
+              <a:avLst/>
+            </a:prstGeom>
+            <a:noFill/>
+            <a:ln>
+              <a:solidFill>
+                <a:srgbClr val="23B4A4"/>
+              </a:solidFill>
+            </a:ln>
+          </p:spPr>
+          <p:style>
+            <a:lnRef idx="2">
+              <a:schemeClr val="accent1">
+                <a:shade val="50000"/>
+              </a:schemeClr>
+            </a:lnRef>
+            <a:fillRef idx="1">
+              <a:schemeClr val="accent1"/>
+            </a:fillRef>
+            <a:effectRef idx="0">
+              <a:schemeClr val="accent1"/>
+            </a:effectRef>
+            <a:fontRef idx="minor">
+              <a:schemeClr val="lt1"/>
+            </a:fontRef>
+          </p:style>
+          <p:txBody>
+            <a:bodyPr rtlCol="0" anchor="ctr"/>
+            <a:lstStyle/>
+            <a:p>
+              <a:pPr algn="ctr"/>
+              <a:endParaRPr lang="en-US"/>
+            </a:p>
+          </p:txBody>
+        </p:sp>
+      </p:grpSp>
+      <p:grpSp>
+        <p:nvGrpSpPr>
+          <p:cNvPr id="15" name="Group 14"/>
+          <p:cNvGrpSpPr/>
+          <p:nvPr/>
+        </p:nvGrpSpPr>
+        <p:grpSpPr>
+          <a:xfrm>
+            <a:off x="6394076" y="851644"/>
+            <a:ext cx="2438400" cy="2438403"/>
+            <a:chOff x="6394076" y="851644"/>
+            <a:chExt cx="2438400" cy="2438403"/>
+          </a:xfrm>
+        </p:grpSpPr>
+        <p:pic>
+          <p:nvPicPr>
+            <p:cNvPr id="3" name="Picture 2"/>
+            <p:cNvPicPr>
+              <a:picLocks noChangeAspect="1"/>
+            </p:cNvPicPr>
+            <p:nvPr/>
+          </p:nvPicPr>
+          <p:blipFill>
+            <a:blip r:embed="rId4">
+              <a:extLst>
+                <a:ext uri="{28A0092B-C50C-407E-A947-70E740481C1C}">
+                  <a14:useLocalDpi xmlns:a14="http://schemas.microsoft.com/office/drawing/2010/main" val="0"/>
+                </a:ext>
+              </a:extLst>
+            </a:blip>
+            <a:stretch>
+              <a:fillRect/>
+            </a:stretch>
+          </p:blipFill>
+          <p:spPr>
+            <a:xfrm>
+              <a:off x="6394076" y="851647"/>
+              <a:ext cx="2438400" cy="2438400"/>
+            </a:xfrm>
+            <a:prstGeom prst="rect">
+              <a:avLst/>
+            </a:prstGeom>
+          </p:spPr>
+        </p:pic>
+        <p:sp>
+          <p:nvSpPr>
+            <p:cNvPr id="13" name="Oval 12"/>
+            <p:cNvSpPr/>
+            <p:nvPr/>
+          </p:nvSpPr>
+          <p:spPr>
+            <a:xfrm>
+              <a:off x="6394076" y="851644"/>
+              <a:ext cx="2438399" cy="2438399"/>
+            </a:xfrm>
+            <a:prstGeom prst="ellipse">
+              <a:avLst/>
+            </a:prstGeom>
+            <a:noFill/>
+            <a:ln>
+              <a:solidFill>
+                <a:srgbClr val="23B4A4"/>
+              </a:solidFill>
+            </a:ln>
+          </p:spPr>
+          <p:style>
+            <a:lnRef idx="2">
+              <a:schemeClr val="accent1">
+                <a:shade val="50000"/>
+              </a:schemeClr>
+            </a:lnRef>
+            <a:fillRef idx="1">
+              <a:schemeClr val="accent1"/>
+            </a:fillRef>
+            <a:effectRef idx="0">
+              <a:schemeClr val="accent1"/>
+            </a:effectRef>
+            <a:fontRef idx="minor">
+              <a:schemeClr val="lt1"/>
+            </a:fontRef>
+          </p:style>
+          <p:txBody>
+            <a:bodyPr rtlCol="0" anchor="ctr"/>
+            <a:lstStyle/>
+            <a:p>
+              <a:pPr algn="ctr"/>
+              <a:endParaRPr lang="en-US"/>
+            </a:p>
+          </p:txBody>
+        </p:sp>
+      </p:grpSp>
+      <p:grpSp>
+        <p:nvGrpSpPr>
+          <p:cNvPr id="16" name="Group 15"/>
+          <p:cNvGrpSpPr/>
+          <p:nvPr/>
+        </p:nvGrpSpPr>
+        <p:grpSpPr>
+          <a:xfrm>
+            <a:off x="9417421" y="851644"/>
+            <a:ext cx="2442884" cy="2438403"/>
+            <a:chOff x="9417421" y="851644"/>
+            <a:chExt cx="2442884" cy="2438403"/>
+          </a:xfrm>
+        </p:grpSpPr>
+        <p:pic>
+          <p:nvPicPr>
+            <p:cNvPr id="5" name="Picture 4"/>
+            <p:cNvPicPr>
+              <a:picLocks noChangeAspect="1"/>
+            </p:cNvPicPr>
+            <p:nvPr/>
+          </p:nvPicPr>
+          <p:blipFill>
+            <a:blip r:embed="rId5">
+              <a:extLst>
+                <a:ext uri="{28A0092B-C50C-407E-A947-70E740481C1C}">
+                  <a14:useLocalDpi xmlns:a14="http://schemas.microsoft.com/office/drawing/2010/main" val="0"/>
+                </a:ext>
+              </a:extLst>
+            </a:blip>
+            <a:stretch>
+              <a:fillRect/>
+            </a:stretch>
+          </p:blipFill>
+          <p:spPr>
+            <a:xfrm>
+              <a:off x="9421905" y="851647"/>
+              <a:ext cx="2438400" cy="2438400"/>
+            </a:xfrm>
+            <a:prstGeom prst="rect">
+              <a:avLst/>
+            </a:prstGeom>
+          </p:spPr>
+        </p:pic>
+        <p:sp>
+          <p:nvSpPr>
+            <p:cNvPr id="14" name="Oval 13"/>
+            <p:cNvSpPr/>
+            <p:nvPr/>
+          </p:nvSpPr>
+          <p:spPr>
+            <a:xfrm>
+              <a:off x="9417421" y="851644"/>
+              <a:ext cx="2438399" cy="2438399"/>
+            </a:xfrm>
+            <a:prstGeom prst="ellipse">
+              <a:avLst/>
+            </a:prstGeom>
+            <a:noFill/>
+            <a:ln>
+              <a:solidFill>
+                <a:srgbClr val="23B4A4"/>
+              </a:solidFill>
+            </a:ln>
+          </p:spPr>
+          <p:style>
+            <a:lnRef idx="2">
+              <a:schemeClr val="accent1">
+                <a:shade val="50000"/>
+              </a:schemeClr>
+            </a:lnRef>
+            <a:fillRef idx="1">
+              <a:schemeClr val="accent1"/>
+            </a:fillRef>
+            <a:effectRef idx="0">
+              <a:schemeClr val="accent1"/>
+            </a:effectRef>
+            <a:fontRef idx="minor">
+              <a:schemeClr val="lt1"/>
+            </a:fontRef>
+          </p:style>
+          <p:txBody>
+            <a:bodyPr rtlCol="0" anchor="ctr"/>
+            <a:lstStyle/>
+            <a:p>
+              <a:pPr algn="ctr"/>
+              <a:endParaRPr lang="en-US"/>
+            </a:p>
+          </p:txBody>
+        </p:sp>
+      </p:grpSp>
     </p:spTree>
     <p:extLst>
       <p:ext uri="{BB962C8B-B14F-4D97-AF65-F5344CB8AC3E}">

</xml_diff>